<commit_message>
Finalización de Entrdas y Salidas a través del formulario
</commit_message>
<xml_diff>
--- a/static/assets/img_banner.pptx
+++ b/static/assets/img_banner.pptx
@@ -243,7 +243,7 @@
           <a:p>
             <a:fld id="{E370D5EA-EF58-485D-A8D3-8A63271A9F90}" type="datetimeFigureOut">
               <a:rPr lang="es-MX" smtClean="0"/>
-              <a:t>30/07/2024</a:t>
+              <a:t>31/07/2024</a:t>
             </a:fld>
             <a:endParaRPr lang="es-MX"/>
           </a:p>
@@ -413,7 +413,7 @@
           <a:p>
             <a:fld id="{E370D5EA-EF58-485D-A8D3-8A63271A9F90}" type="datetimeFigureOut">
               <a:rPr lang="es-MX" smtClean="0"/>
-              <a:t>30/07/2024</a:t>
+              <a:t>31/07/2024</a:t>
             </a:fld>
             <a:endParaRPr lang="es-MX"/>
           </a:p>
@@ -593,7 +593,7 @@
           <a:p>
             <a:fld id="{E370D5EA-EF58-485D-A8D3-8A63271A9F90}" type="datetimeFigureOut">
               <a:rPr lang="es-MX" smtClean="0"/>
-              <a:t>30/07/2024</a:t>
+              <a:t>31/07/2024</a:t>
             </a:fld>
             <a:endParaRPr lang="es-MX"/>
           </a:p>
@@ -763,7 +763,7 @@
           <a:p>
             <a:fld id="{E370D5EA-EF58-485D-A8D3-8A63271A9F90}" type="datetimeFigureOut">
               <a:rPr lang="es-MX" smtClean="0"/>
-              <a:t>30/07/2024</a:t>
+              <a:t>31/07/2024</a:t>
             </a:fld>
             <a:endParaRPr lang="es-MX"/>
           </a:p>
@@ -1007,7 +1007,7 @@
           <a:p>
             <a:fld id="{E370D5EA-EF58-485D-A8D3-8A63271A9F90}" type="datetimeFigureOut">
               <a:rPr lang="es-MX" smtClean="0"/>
-              <a:t>30/07/2024</a:t>
+              <a:t>31/07/2024</a:t>
             </a:fld>
             <a:endParaRPr lang="es-MX"/>
           </a:p>
@@ -1239,7 +1239,7 @@
           <a:p>
             <a:fld id="{E370D5EA-EF58-485D-A8D3-8A63271A9F90}" type="datetimeFigureOut">
               <a:rPr lang="es-MX" smtClean="0"/>
-              <a:t>30/07/2024</a:t>
+              <a:t>31/07/2024</a:t>
             </a:fld>
             <a:endParaRPr lang="es-MX"/>
           </a:p>
@@ -1606,7 +1606,7 @@
           <a:p>
             <a:fld id="{E370D5EA-EF58-485D-A8D3-8A63271A9F90}" type="datetimeFigureOut">
               <a:rPr lang="es-MX" smtClean="0"/>
-              <a:t>30/07/2024</a:t>
+              <a:t>31/07/2024</a:t>
             </a:fld>
             <a:endParaRPr lang="es-MX"/>
           </a:p>
@@ -1724,7 +1724,7 @@
           <a:p>
             <a:fld id="{E370D5EA-EF58-485D-A8D3-8A63271A9F90}" type="datetimeFigureOut">
               <a:rPr lang="es-MX" smtClean="0"/>
-              <a:t>30/07/2024</a:t>
+              <a:t>31/07/2024</a:t>
             </a:fld>
             <a:endParaRPr lang="es-MX"/>
           </a:p>
@@ -1819,7 +1819,7 @@
           <a:p>
             <a:fld id="{E370D5EA-EF58-485D-A8D3-8A63271A9F90}" type="datetimeFigureOut">
               <a:rPr lang="es-MX" smtClean="0"/>
-              <a:t>30/07/2024</a:t>
+              <a:t>31/07/2024</a:t>
             </a:fld>
             <a:endParaRPr lang="es-MX"/>
           </a:p>
@@ -2096,7 +2096,7 @@
           <a:p>
             <a:fld id="{E370D5EA-EF58-485D-A8D3-8A63271A9F90}" type="datetimeFigureOut">
               <a:rPr lang="es-MX" smtClean="0"/>
-              <a:t>30/07/2024</a:t>
+              <a:t>31/07/2024</a:t>
             </a:fld>
             <a:endParaRPr lang="es-MX"/>
           </a:p>
@@ -2353,7 +2353,7 @@
           <a:p>
             <a:fld id="{E370D5EA-EF58-485D-A8D3-8A63271A9F90}" type="datetimeFigureOut">
               <a:rPr lang="es-MX" smtClean="0"/>
-              <a:t>30/07/2024</a:t>
+              <a:t>31/07/2024</a:t>
             </a:fld>
             <a:endParaRPr lang="es-MX"/>
           </a:p>
@@ -2566,7 +2566,7 @@
           <a:p>
             <a:fld id="{E370D5EA-EF58-485D-A8D3-8A63271A9F90}" type="datetimeFigureOut">
               <a:rPr lang="es-MX" smtClean="0"/>
-              <a:t>30/07/2024</a:t>
+              <a:t>31/07/2024</a:t>
             </a:fld>
             <a:endParaRPr lang="es-MX"/>
           </a:p>
@@ -2973,10 +2973,10 @@
       </p:grpSpPr>
       <p:pic>
         <p:nvPicPr>
-          <p:cNvPr id="1028" name="Picture 4" descr="Free Photo | Close-up of stylish attractive girl with hairbun smiling and  looking hopeful">
+          <p:cNvPr id="1026" name="Picture 2" descr="5 beneficios de un headshot profesional">
             <a:extLst>
               <a:ext uri="{FF2B5EF4-FFF2-40B4-BE49-F238E27FC236}">
-                <a16:creationId xmlns:a16="http://schemas.microsoft.com/office/drawing/2014/main" id="{F8E7402A-A46F-4813-8C11-A8F51341782D}"/>
+                <a16:creationId xmlns:a16="http://schemas.microsoft.com/office/drawing/2014/main" id="{5FFCE0EC-32A9-4237-A7D0-8C82C992BE4A}"/>
               </a:ext>
             </a:extLst>
           </p:cNvPr>
@@ -3000,8 +3000,8 @@
         </p:blipFill>
         <p:spPr bwMode="auto">
           <a:xfrm>
-            <a:off x="-4572000" y="-40928"/>
-            <a:ext cx="27139392" cy="18078477"/>
+            <a:off x="-365760" y="-102362"/>
+            <a:ext cx="18763488" cy="18235765"/>
           </a:xfrm>
           <a:prstGeom prst="rect">
             <a:avLst/>

</xml_diff>

<commit_message>
Ya esta creada la bd de interfaz y muestra los datos
</commit_message>
<xml_diff>
--- a/static/assets/img_banner.pptx
+++ b/static/assets/img_banner.pptx
@@ -243,7 +243,7 @@
           <a:p>
             <a:fld id="{E370D5EA-EF58-485D-A8D3-8A63271A9F90}" type="datetimeFigureOut">
               <a:rPr lang="es-MX" smtClean="0"/>
-              <a:t>31/07/2024</a:t>
+              <a:t>09/08/2024</a:t>
             </a:fld>
             <a:endParaRPr lang="es-MX"/>
           </a:p>
@@ -413,7 +413,7 @@
           <a:p>
             <a:fld id="{E370D5EA-EF58-485D-A8D3-8A63271A9F90}" type="datetimeFigureOut">
               <a:rPr lang="es-MX" smtClean="0"/>
-              <a:t>31/07/2024</a:t>
+              <a:t>09/08/2024</a:t>
             </a:fld>
             <a:endParaRPr lang="es-MX"/>
           </a:p>
@@ -593,7 +593,7 @@
           <a:p>
             <a:fld id="{E370D5EA-EF58-485D-A8D3-8A63271A9F90}" type="datetimeFigureOut">
               <a:rPr lang="es-MX" smtClean="0"/>
-              <a:t>31/07/2024</a:t>
+              <a:t>09/08/2024</a:t>
             </a:fld>
             <a:endParaRPr lang="es-MX"/>
           </a:p>
@@ -763,7 +763,7 @@
           <a:p>
             <a:fld id="{E370D5EA-EF58-485D-A8D3-8A63271A9F90}" type="datetimeFigureOut">
               <a:rPr lang="es-MX" smtClean="0"/>
-              <a:t>31/07/2024</a:t>
+              <a:t>09/08/2024</a:t>
             </a:fld>
             <a:endParaRPr lang="es-MX"/>
           </a:p>
@@ -1007,7 +1007,7 @@
           <a:p>
             <a:fld id="{E370D5EA-EF58-485D-A8D3-8A63271A9F90}" type="datetimeFigureOut">
               <a:rPr lang="es-MX" smtClean="0"/>
-              <a:t>31/07/2024</a:t>
+              <a:t>09/08/2024</a:t>
             </a:fld>
             <a:endParaRPr lang="es-MX"/>
           </a:p>
@@ -1239,7 +1239,7 @@
           <a:p>
             <a:fld id="{E370D5EA-EF58-485D-A8D3-8A63271A9F90}" type="datetimeFigureOut">
               <a:rPr lang="es-MX" smtClean="0"/>
-              <a:t>31/07/2024</a:t>
+              <a:t>09/08/2024</a:t>
             </a:fld>
             <a:endParaRPr lang="es-MX"/>
           </a:p>
@@ -1606,7 +1606,7 @@
           <a:p>
             <a:fld id="{E370D5EA-EF58-485D-A8D3-8A63271A9F90}" type="datetimeFigureOut">
               <a:rPr lang="es-MX" smtClean="0"/>
-              <a:t>31/07/2024</a:t>
+              <a:t>09/08/2024</a:t>
             </a:fld>
             <a:endParaRPr lang="es-MX"/>
           </a:p>
@@ -1724,7 +1724,7 @@
           <a:p>
             <a:fld id="{E370D5EA-EF58-485D-A8D3-8A63271A9F90}" type="datetimeFigureOut">
               <a:rPr lang="es-MX" smtClean="0"/>
-              <a:t>31/07/2024</a:t>
+              <a:t>09/08/2024</a:t>
             </a:fld>
             <a:endParaRPr lang="es-MX"/>
           </a:p>
@@ -1819,7 +1819,7 @@
           <a:p>
             <a:fld id="{E370D5EA-EF58-485D-A8D3-8A63271A9F90}" type="datetimeFigureOut">
               <a:rPr lang="es-MX" smtClean="0"/>
-              <a:t>31/07/2024</a:t>
+              <a:t>09/08/2024</a:t>
             </a:fld>
             <a:endParaRPr lang="es-MX"/>
           </a:p>
@@ -2096,7 +2096,7 @@
           <a:p>
             <a:fld id="{E370D5EA-EF58-485D-A8D3-8A63271A9F90}" type="datetimeFigureOut">
               <a:rPr lang="es-MX" smtClean="0"/>
-              <a:t>31/07/2024</a:t>
+              <a:t>09/08/2024</a:t>
             </a:fld>
             <a:endParaRPr lang="es-MX"/>
           </a:p>
@@ -2353,7 +2353,7 @@
           <a:p>
             <a:fld id="{E370D5EA-EF58-485D-A8D3-8A63271A9F90}" type="datetimeFigureOut">
               <a:rPr lang="es-MX" smtClean="0"/>
-              <a:t>31/07/2024</a:t>
+              <a:t>09/08/2024</a:t>
             </a:fld>
             <a:endParaRPr lang="es-MX"/>
           </a:p>
@@ -2566,7 +2566,7 @@
           <a:p>
             <a:fld id="{E370D5EA-EF58-485D-A8D3-8A63271A9F90}" type="datetimeFigureOut">
               <a:rPr lang="es-MX" smtClean="0"/>
-              <a:t>31/07/2024</a:t>
+              <a:t>09/08/2024</a:t>
             </a:fld>
             <a:endParaRPr lang="es-MX"/>
           </a:p>
@@ -2973,10 +2973,10 @@
       </p:grpSpPr>
       <p:pic>
         <p:nvPicPr>
-          <p:cNvPr id="1026" name="Picture 2" descr="5 beneficios de un headshot profesional">
+          <p:cNvPr id="2" name="Picture 2" descr="Cyber Logo Design Vector Template: vector de stock (libre de regalías)  1210310944 | Shutterstock">
             <a:extLst>
               <a:ext uri="{FF2B5EF4-FFF2-40B4-BE49-F238E27FC236}">
-                <a16:creationId xmlns:a16="http://schemas.microsoft.com/office/drawing/2014/main" id="{5FFCE0EC-32A9-4237-A7D0-8C82C992BE4A}"/>
+                <a16:creationId xmlns:a16="http://schemas.microsoft.com/office/drawing/2014/main" id="{2EF968B9-FB72-4419-A840-8794B5681DFD}"/>
               </a:ext>
             </a:extLst>
           </p:cNvPr>
@@ -3000,8 +3000,8 @@
         </p:blipFill>
         <p:spPr bwMode="auto">
           <a:xfrm>
-            <a:off x="-365760" y="-102362"/>
-            <a:ext cx="18763488" cy="18235765"/>
+            <a:off x="-1097280" y="-1883515"/>
+            <a:ext cx="20299680" cy="21652992"/>
           </a:xfrm>
           <a:prstGeom prst="rect">
             <a:avLst/>

</xml_diff>

<commit_message>
Ya solo falta imagenes y responsivo y ventana emergente de actualizacion de usario y editar hora visualizacion
</commit_message>
<xml_diff>
--- a/static/assets/img_banner.pptx
+++ b/static/assets/img_banner.pptx
@@ -243,7 +243,7 @@
           <a:p>
             <a:fld id="{E370D5EA-EF58-485D-A8D3-8A63271A9F90}" type="datetimeFigureOut">
               <a:rPr lang="es-MX" smtClean="0"/>
-              <a:t>09/08/2024</a:t>
+              <a:t>11/08/2024</a:t>
             </a:fld>
             <a:endParaRPr lang="es-MX"/>
           </a:p>
@@ -413,7 +413,7 @@
           <a:p>
             <a:fld id="{E370D5EA-EF58-485D-A8D3-8A63271A9F90}" type="datetimeFigureOut">
               <a:rPr lang="es-MX" smtClean="0"/>
-              <a:t>09/08/2024</a:t>
+              <a:t>11/08/2024</a:t>
             </a:fld>
             <a:endParaRPr lang="es-MX"/>
           </a:p>
@@ -593,7 +593,7 @@
           <a:p>
             <a:fld id="{E370D5EA-EF58-485D-A8D3-8A63271A9F90}" type="datetimeFigureOut">
               <a:rPr lang="es-MX" smtClean="0"/>
-              <a:t>09/08/2024</a:t>
+              <a:t>11/08/2024</a:t>
             </a:fld>
             <a:endParaRPr lang="es-MX"/>
           </a:p>
@@ -763,7 +763,7 @@
           <a:p>
             <a:fld id="{E370D5EA-EF58-485D-A8D3-8A63271A9F90}" type="datetimeFigureOut">
               <a:rPr lang="es-MX" smtClean="0"/>
-              <a:t>09/08/2024</a:t>
+              <a:t>11/08/2024</a:t>
             </a:fld>
             <a:endParaRPr lang="es-MX"/>
           </a:p>
@@ -1007,7 +1007,7 @@
           <a:p>
             <a:fld id="{E370D5EA-EF58-485D-A8D3-8A63271A9F90}" type="datetimeFigureOut">
               <a:rPr lang="es-MX" smtClean="0"/>
-              <a:t>09/08/2024</a:t>
+              <a:t>11/08/2024</a:t>
             </a:fld>
             <a:endParaRPr lang="es-MX"/>
           </a:p>
@@ -1239,7 +1239,7 @@
           <a:p>
             <a:fld id="{E370D5EA-EF58-485D-A8D3-8A63271A9F90}" type="datetimeFigureOut">
               <a:rPr lang="es-MX" smtClean="0"/>
-              <a:t>09/08/2024</a:t>
+              <a:t>11/08/2024</a:t>
             </a:fld>
             <a:endParaRPr lang="es-MX"/>
           </a:p>
@@ -1606,7 +1606,7 @@
           <a:p>
             <a:fld id="{E370D5EA-EF58-485D-A8D3-8A63271A9F90}" type="datetimeFigureOut">
               <a:rPr lang="es-MX" smtClean="0"/>
-              <a:t>09/08/2024</a:t>
+              <a:t>11/08/2024</a:t>
             </a:fld>
             <a:endParaRPr lang="es-MX"/>
           </a:p>
@@ -1724,7 +1724,7 @@
           <a:p>
             <a:fld id="{E370D5EA-EF58-485D-A8D3-8A63271A9F90}" type="datetimeFigureOut">
               <a:rPr lang="es-MX" smtClean="0"/>
-              <a:t>09/08/2024</a:t>
+              <a:t>11/08/2024</a:t>
             </a:fld>
             <a:endParaRPr lang="es-MX"/>
           </a:p>
@@ -1819,7 +1819,7 @@
           <a:p>
             <a:fld id="{E370D5EA-EF58-485D-A8D3-8A63271A9F90}" type="datetimeFigureOut">
               <a:rPr lang="es-MX" smtClean="0"/>
-              <a:t>09/08/2024</a:t>
+              <a:t>11/08/2024</a:t>
             </a:fld>
             <a:endParaRPr lang="es-MX"/>
           </a:p>
@@ -2096,7 +2096,7 @@
           <a:p>
             <a:fld id="{E370D5EA-EF58-485D-A8D3-8A63271A9F90}" type="datetimeFigureOut">
               <a:rPr lang="es-MX" smtClean="0"/>
-              <a:t>09/08/2024</a:t>
+              <a:t>11/08/2024</a:t>
             </a:fld>
             <a:endParaRPr lang="es-MX"/>
           </a:p>
@@ -2353,7 +2353,7 @@
           <a:p>
             <a:fld id="{E370D5EA-EF58-485D-A8D3-8A63271A9F90}" type="datetimeFigureOut">
               <a:rPr lang="es-MX" smtClean="0"/>
-              <a:t>09/08/2024</a:t>
+              <a:t>11/08/2024</a:t>
             </a:fld>
             <a:endParaRPr lang="es-MX"/>
           </a:p>
@@ -2566,7 +2566,7 @@
           <a:p>
             <a:fld id="{E370D5EA-EF58-485D-A8D3-8A63271A9F90}" type="datetimeFigureOut">
               <a:rPr lang="es-MX" smtClean="0"/>
-              <a:t>09/08/2024</a:t>
+              <a:t>11/08/2024</a:t>
             </a:fld>
             <a:endParaRPr lang="es-MX"/>
           </a:p>
@@ -2971,12 +2971,124 @@
           <a:chExt cx="0" cy="0"/>
         </a:xfrm>
       </p:grpSpPr>
+      <p:sp>
+        <p:nvSpPr>
+          <p:cNvPr id="3" name="Rectángulo 2">
+            <a:extLst>
+              <a:ext uri="{FF2B5EF4-FFF2-40B4-BE49-F238E27FC236}">
+                <a16:creationId xmlns:a16="http://schemas.microsoft.com/office/drawing/2014/main" id="{6BCED92F-C224-4E02-9E60-26757CC99A51}"/>
+              </a:ext>
+            </a:extLst>
+          </p:cNvPr>
+          <p:cNvSpPr/>
+          <p:nvPr/>
+        </p:nvSpPr>
+        <p:spPr>
+          <a:xfrm>
+            <a:off x="-438912" y="-146304"/>
+            <a:ext cx="18873216" cy="18544032"/>
+          </a:xfrm>
+          <a:prstGeom prst="rect">
+            <a:avLst/>
+          </a:prstGeom>
+          <a:solidFill>
+            <a:schemeClr val="bg1">
+              <a:lumMod val="75000"/>
+            </a:schemeClr>
+          </a:solidFill>
+          <a:ln>
+            <a:solidFill>
+              <a:schemeClr val="bg1">
+                <a:lumMod val="65000"/>
+              </a:schemeClr>
+            </a:solidFill>
+          </a:ln>
+        </p:spPr>
+        <p:style>
+          <a:lnRef idx="2">
+            <a:schemeClr val="accent1">
+              <a:shade val="50000"/>
+            </a:schemeClr>
+          </a:lnRef>
+          <a:fillRef idx="1">
+            <a:schemeClr val="accent1"/>
+          </a:fillRef>
+          <a:effectRef idx="0">
+            <a:schemeClr val="accent1"/>
+          </a:effectRef>
+          <a:fontRef idx="minor">
+            <a:schemeClr val="lt1"/>
+          </a:fontRef>
+        </p:style>
+        <p:txBody>
+          <a:bodyPr rtlCol="0" anchor="ctr"/>
+          <a:lstStyle/>
+          <a:p>
+            <a:pPr algn="ctr"/>
+            <a:endParaRPr lang="es-MX"/>
+          </a:p>
+        </p:txBody>
+      </p:sp>
+      <p:sp>
+        <p:nvSpPr>
+          <p:cNvPr id="7" name="Rectángulo 6">
+            <a:extLst>
+              <a:ext uri="{FF2B5EF4-FFF2-40B4-BE49-F238E27FC236}">
+                <a16:creationId xmlns:a16="http://schemas.microsoft.com/office/drawing/2014/main" id="{D7DBEED3-029B-4625-B7FB-5252C37E502A}"/>
+              </a:ext>
+            </a:extLst>
+          </p:cNvPr>
+          <p:cNvSpPr/>
+          <p:nvPr/>
+        </p:nvSpPr>
+        <p:spPr>
+          <a:xfrm flipV="1">
+            <a:off x="-286512" y="17363301"/>
+            <a:ext cx="18873216" cy="2646405"/>
+          </a:xfrm>
+          <a:prstGeom prst="rect">
+            <a:avLst/>
+          </a:prstGeom>
+          <a:solidFill>
+            <a:srgbClr val="BFBFBF"/>
+          </a:solidFill>
+          <a:ln>
+            <a:solidFill>
+              <a:srgbClr val="BFBFBF"/>
+            </a:solidFill>
+          </a:ln>
+        </p:spPr>
+        <p:style>
+          <a:lnRef idx="2">
+            <a:schemeClr val="accent1">
+              <a:shade val="50000"/>
+            </a:schemeClr>
+          </a:lnRef>
+          <a:fillRef idx="1">
+            <a:schemeClr val="accent1"/>
+          </a:fillRef>
+          <a:effectRef idx="0">
+            <a:schemeClr val="accent1"/>
+          </a:effectRef>
+          <a:fontRef idx="minor">
+            <a:schemeClr val="lt1"/>
+          </a:fontRef>
+        </p:style>
+        <p:txBody>
+          <a:bodyPr rtlCol="0" anchor="ctr"/>
+          <a:lstStyle/>
+          <a:p>
+            <a:pPr algn="ctr"/>
+            <a:endParaRPr lang="es-MX"/>
+          </a:p>
+        </p:txBody>
+      </p:sp>
       <p:pic>
         <p:nvPicPr>
-          <p:cNvPr id="2" name="Picture 2" descr="Cyber Logo Design Vector Template: vector de stock (libre de regalías)  1210310944 | Shutterstock">
+          <p:cNvPr id="1026" name="Picture 2" descr="Vector de icono de imagen predeterminado Página de imagen faltante para  diseño de sitio web o aplicación móvil No hay foto disponible | Vector  Premium">
             <a:extLst>
               <a:ext uri="{FF2B5EF4-FFF2-40B4-BE49-F238E27FC236}">
-                <a16:creationId xmlns:a16="http://schemas.microsoft.com/office/drawing/2014/main" id="{2EF968B9-FB72-4419-A840-8794B5681DFD}"/>
+                <a16:creationId xmlns:a16="http://schemas.microsoft.com/office/drawing/2014/main" id="{965ECB42-5E74-40FB-BBBC-F177409DB6A3}"/>
               </a:ext>
             </a:extLst>
           </p:cNvPr>
@@ -2988,6 +3100,17 @@
         <p:blipFill>
           <a:blip r:embed="rId2">
             <a:extLst>
+              <a:ext uri="{BEBA8EAE-BF5A-486C-A8C5-ECC9F3942E4B}">
+                <a14:imgProps xmlns:a14="http://schemas.microsoft.com/office/drawing/2010/main">
+                  <a14:imgLayer r:embed="rId3">
+                    <a14:imgEffect>
+                      <a14:backgroundRemoval t="10000" b="90000" l="10000" r="90000">
+                        <a14:foregroundMark x1="38658" y1="37872" x2="38658" y2="37872"/>
+                      </a14:backgroundRemoval>
+                    </a14:imgEffect>
+                  </a14:imgLayer>
+                </a14:imgProps>
+              </a:ext>
               <a:ext uri="{28A0092B-C50C-407E-A947-70E740481C1C}">
                 <a14:useLocalDpi xmlns:a14="http://schemas.microsoft.com/office/drawing/2010/main" val="0"/>
               </a:ext>
@@ -3000,8 +3123,8 @@
         </p:blipFill>
         <p:spPr bwMode="auto">
           <a:xfrm>
-            <a:off x="-1097280" y="-1883515"/>
-            <a:ext cx="20299680" cy="21652992"/>
+            <a:off x="-2545953" y="333374"/>
+            <a:ext cx="23087297" cy="17333913"/>
           </a:xfrm>
           <a:prstGeom prst="rect">
             <a:avLst/>
@@ -3018,6 +3141,48 @@
           </a:extLst>
         </p:spPr>
       </p:pic>
+      <p:sp>
+        <p:nvSpPr>
+          <p:cNvPr id="12" name="CuadroTexto 11">
+            <a:extLst>
+              <a:ext uri="{FF2B5EF4-FFF2-40B4-BE49-F238E27FC236}">
+                <a16:creationId xmlns:a16="http://schemas.microsoft.com/office/drawing/2014/main" id="{66BEEC96-0015-4C71-AACE-B133085F6EE9}"/>
+              </a:ext>
+            </a:extLst>
+          </p:cNvPr>
+          <p:cNvSpPr txBox="1"/>
+          <p:nvPr/>
+        </p:nvSpPr>
+        <p:spPr>
+          <a:xfrm>
+            <a:off x="2438400" y="13411200"/>
+            <a:ext cx="12192000" cy="1862048"/>
+          </a:xfrm>
+          <a:prstGeom prst="rect">
+            <a:avLst/>
+          </a:prstGeom>
+          <a:noFill/>
+        </p:spPr>
+        <p:txBody>
+          <a:bodyPr wrap="square" rtlCol="0">
+            <a:spAutoFit/>
+          </a:bodyPr>
+          <a:lstStyle/>
+          <a:p>
+            <a:pPr algn="ctr"/>
+            <a:r>
+              <a:rPr lang="es-MX" sz="11500" b="1" dirty="0">
+                <a:solidFill>
+                  <a:srgbClr val="666666"/>
+                </a:solidFill>
+                <a:latin typeface="Arial" panose="020B0604020202020204" pitchFamily="34" charset="0"/>
+                <a:cs typeface="Arial" panose="020B0604020202020204" pitchFamily="34" charset="0"/>
+              </a:rPr>
+              <a:t>NO IMAGEN</a:t>
+            </a:r>
+          </a:p>
+        </p:txBody>
+      </p:sp>
     </p:spTree>
     <p:extLst>
       <p:ext uri="{BB962C8B-B14F-4D97-AF65-F5344CB8AC3E}">

</xml_diff>